<commit_message>
everyone's part assembled in presentation
</commit_message>
<xml_diff>
--- a/Final presentation/Presentation.pptx
+++ b/Final presentation/Presentation.pptx
@@ -13,7 +13,7 @@
     <p:sldId id="258" r:id="rId4"/>
     <p:sldId id="259" r:id="rId5"/>
     <p:sldId id="260" r:id="rId6"/>
-    <p:sldId id="262" r:id="rId7"/>
+    <p:sldId id="265" r:id="rId7"/>
     <p:sldId id="263" r:id="rId8"/>
     <p:sldId id="264" r:id="rId9"/>
     <p:sldId id="261" r:id="rId10"/>
@@ -205,7 +205,7 @@
           <a:p>
             <a:fld id="{6BB61C4D-B0B3-4659-BD36-E672C5714509}" type="datetimeFigureOut">
               <a:rPr lang="LID4096" smtClean="0"/>
-              <a:t>06/10/2019</a:t>
+              <a:t>06/11/2019</a:t>
             </a:fld>
             <a:endParaRPr lang="LID4096"/>
           </a:p>
@@ -657,6 +657,174 @@
 </p:notes>
 </file>
 
+<file path=ppt/notesSlides/notesSlide3.xml><?xml version="1.0" encoding="utf-8"?>
+<p:notes xmlns:a="http://schemas.openxmlformats.org/drawingml/2006/main" xmlns:r="http://schemas.openxmlformats.org/officeDocument/2006/relationships" xmlns:p="http://schemas.openxmlformats.org/presentationml/2006/main">
+  <p:cSld>
+    <p:spTree>
+      <p:nvGrpSpPr>
+        <p:cNvPr id="1" name=""/>
+        <p:cNvGrpSpPr/>
+        <p:nvPr/>
+      </p:nvGrpSpPr>
+      <p:grpSpPr>
+        <a:xfrm>
+          <a:off x="0" y="0"/>
+          <a:ext cx="0" cy="0"/>
+          <a:chOff x="0" y="0"/>
+          <a:chExt cx="0" cy="0"/>
+        </a:xfrm>
+      </p:grpSpPr>
+      <p:sp>
+        <p:nvSpPr>
+          <p:cNvPr id="2" name="Slide Image Placeholder 1"/>
+          <p:cNvSpPr>
+            <a:spLocks noGrp="1" noRot="1" noChangeAspect="1"/>
+          </p:cNvSpPr>
+          <p:nvPr>
+            <p:ph type="sldImg"/>
+          </p:nvPr>
+        </p:nvSpPr>
+        <p:spPr/>
+      </p:sp>
+      <p:sp>
+        <p:nvSpPr>
+          <p:cNvPr id="3" name="Notes Placeholder 2"/>
+          <p:cNvSpPr>
+            <a:spLocks noGrp="1"/>
+          </p:cNvSpPr>
+          <p:nvPr>
+            <p:ph type="body" idx="1"/>
+          </p:nvPr>
+        </p:nvSpPr>
+        <p:spPr/>
+        <p:txBody>
+          <a:bodyPr/>
+          <a:lstStyle/>
+          <a:p>
+            <a:endParaRPr lang="en-NL" dirty="0"/>
+          </a:p>
+        </p:txBody>
+      </p:sp>
+      <p:sp>
+        <p:nvSpPr>
+          <p:cNvPr id="4" name="Slide Number Placeholder 3"/>
+          <p:cNvSpPr>
+            <a:spLocks noGrp="1"/>
+          </p:cNvSpPr>
+          <p:nvPr>
+            <p:ph type="sldNum" sz="quarter" idx="5"/>
+          </p:nvPr>
+        </p:nvSpPr>
+        <p:spPr/>
+        <p:txBody>
+          <a:bodyPr/>
+          <a:lstStyle/>
+          <a:p>
+            <a:fld id="{662FF1DF-F51A-416D-A199-F55D4E4672F4}" type="slidenum">
+              <a:rPr lang="LID4096" smtClean="0"/>
+              <a:t>6</a:t>
+            </a:fld>
+            <a:endParaRPr lang="LID4096"/>
+          </a:p>
+        </p:txBody>
+      </p:sp>
+    </p:spTree>
+    <p:extLst>
+      <p:ext uri="{BB962C8B-B14F-4D97-AF65-F5344CB8AC3E}">
+        <p14:creationId xmlns:p14="http://schemas.microsoft.com/office/powerpoint/2010/main" val="1717458676"/>
+      </p:ext>
+    </p:extLst>
+  </p:cSld>
+  <p:clrMapOvr>
+    <a:masterClrMapping/>
+  </p:clrMapOvr>
+</p:notes>
+</file>
+
+<file path=ppt/notesSlides/notesSlide4.xml><?xml version="1.0" encoding="utf-8"?>
+<p:notes xmlns:a="http://schemas.openxmlformats.org/drawingml/2006/main" xmlns:r="http://schemas.openxmlformats.org/officeDocument/2006/relationships" xmlns:p="http://schemas.openxmlformats.org/presentationml/2006/main">
+  <p:cSld>
+    <p:spTree>
+      <p:nvGrpSpPr>
+        <p:cNvPr id="1" name=""/>
+        <p:cNvGrpSpPr/>
+        <p:nvPr/>
+      </p:nvGrpSpPr>
+      <p:grpSpPr>
+        <a:xfrm>
+          <a:off x="0" y="0"/>
+          <a:ext cx="0" cy="0"/>
+          <a:chOff x="0" y="0"/>
+          <a:chExt cx="0" cy="0"/>
+        </a:xfrm>
+      </p:grpSpPr>
+      <p:sp>
+        <p:nvSpPr>
+          <p:cNvPr id="2" name="Slide Image Placeholder 1"/>
+          <p:cNvSpPr>
+            <a:spLocks noGrp="1" noRot="1" noChangeAspect="1"/>
+          </p:cNvSpPr>
+          <p:nvPr>
+            <p:ph type="sldImg"/>
+          </p:nvPr>
+        </p:nvSpPr>
+        <p:spPr/>
+      </p:sp>
+      <p:sp>
+        <p:nvSpPr>
+          <p:cNvPr id="3" name="Notes Placeholder 2"/>
+          <p:cNvSpPr>
+            <a:spLocks noGrp="1"/>
+          </p:cNvSpPr>
+          <p:nvPr>
+            <p:ph type="body" idx="1"/>
+          </p:nvPr>
+        </p:nvSpPr>
+        <p:spPr/>
+        <p:txBody>
+          <a:bodyPr/>
+          <a:lstStyle/>
+          <a:p>
+            <a:endParaRPr lang="en-NL" dirty="0"/>
+          </a:p>
+        </p:txBody>
+      </p:sp>
+      <p:sp>
+        <p:nvSpPr>
+          <p:cNvPr id="4" name="Slide Number Placeholder 3"/>
+          <p:cNvSpPr>
+            <a:spLocks noGrp="1"/>
+          </p:cNvSpPr>
+          <p:nvPr>
+            <p:ph type="sldNum" sz="quarter" idx="5"/>
+          </p:nvPr>
+        </p:nvSpPr>
+        <p:spPr/>
+        <p:txBody>
+          <a:bodyPr/>
+          <a:lstStyle/>
+          <a:p>
+            <a:fld id="{662FF1DF-F51A-416D-A199-F55D4E4672F4}" type="slidenum">
+              <a:rPr lang="LID4096" smtClean="0"/>
+              <a:t>9</a:t>
+            </a:fld>
+            <a:endParaRPr lang="LID4096"/>
+          </a:p>
+        </p:txBody>
+      </p:sp>
+    </p:spTree>
+    <p:extLst>
+      <p:ext uri="{BB962C8B-B14F-4D97-AF65-F5344CB8AC3E}">
+        <p14:creationId xmlns:p14="http://schemas.microsoft.com/office/powerpoint/2010/main" val="3533993190"/>
+      </p:ext>
+    </p:extLst>
+  </p:cSld>
+  <p:clrMapOvr>
+    <a:masterClrMapping/>
+  </p:clrMapOvr>
+</p:notes>
+</file>
+
 <file path=ppt/slideLayouts/slideLayout1.xml><?xml version="1.0" encoding="utf-8"?>
 <p:sldLayout xmlns:a="http://schemas.openxmlformats.org/drawingml/2006/main" xmlns:r="http://schemas.openxmlformats.org/officeDocument/2006/relationships" xmlns:p="http://schemas.openxmlformats.org/presentationml/2006/main" type="title" preserve="1">
   <p:cSld name="Title Slide">
@@ -806,7 +974,7 @@
           <a:p>
             <a:fld id="{368142B4-7298-43D0-A9D3-D5CA59C3F615}" type="datetimeFigureOut">
               <a:rPr lang="LID4096" smtClean="0"/>
-              <a:t>06/10/2019</a:t>
+              <a:t>06/11/2019</a:t>
             </a:fld>
             <a:endParaRPr lang="LID4096"/>
           </a:p>
@@ -1011,7 +1179,7 @@
           <a:p>
             <a:fld id="{368142B4-7298-43D0-A9D3-D5CA59C3F615}" type="datetimeFigureOut">
               <a:rPr lang="LID4096" smtClean="0"/>
-              <a:t>06/10/2019</a:t>
+              <a:t>06/11/2019</a:t>
             </a:fld>
             <a:endParaRPr lang="LID4096"/>
           </a:p>
@@ -1221,7 +1389,7 @@
           <a:p>
             <a:fld id="{368142B4-7298-43D0-A9D3-D5CA59C3F615}" type="datetimeFigureOut">
               <a:rPr lang="LID4096" smtClean="0"/>
-              <a:t>06/10/2019</a:t>
+              <a:t>06/11/2019</a:t>
             </a:fld>
             <a:endParaRPr lang="LID4096"/>
           </a:p>
@@ -1421,7 +1589,7 @@
           <a:p>
             <a:fld id="{368142B4-7298-43D0-A9D3-D5CA59C3F615}" type="datetimeFigureOut">
               <a:rPr lang="LID4096" smtClean="0"/>
-              <a:t>06/10/2019</a:t>
+              <a:t>06/11/2019</a:t>
             </a:fld>
             <a:endParaRPr lang="LID4096"/>
           </a:p>
@@ -1697,7 +1865,7 @@
           <a:p>
             <a:fld id="{368142B4-7298-43D0-A9D3-D5CA59C3F615}" type="datetimeFigureOut">
               <a:rPr lang="LID4096" smtClean="0"/>
-              <a:t>06/10/2019</a:t>
+              <a:t>06/11/2019</a:t>
             </a:fld>
             <a:endParaRPr lang="LID4096"/>
           </a:p>
@@ -1965,7 +2133,7 @@
           <a:p>
             <a:fld id="{368142B4-7298-43D0-A9D3-D5CA59C3F615}" type="datetimeFigureOut">
               <a:rPr lang="LID4096" smtClean="0"/>
-              <a:t>06/10/2019</a:t>
+              <a:t>06/11/2019</a:t>
             </a:fld>
             <a:endParaRPr lang="LID4096"/>
           </a:p>
@@ -2380,7 +2548,7 @@
           <a:p>
             <a:fld id="{368142B4-7298-43D0-A9D3-D5CA59C3F615}" type="datetimeFigureOut">
               <a:rPr lang="LID4096" smtClean="0"/>
-              <a:t>06/10/2019</a:t>
+              <a:t>06/11/2019</a:t>
             </a:fld>
             <a:endParaRPr lang="LID4096"/>
           </a:p>
@@ -2522,7 +2690,7 @@
           <a:p>
             <a:fld id="{368142B4-7298-43D0-A9D3-D5CA59C3F615}" type="datetimeFigureOut">
               <a:rPr lang="LID4096" smtClean="0"/>
-              <a:t>06/10/2019</a:t>
+              <a:t>06/11/2019</a:t>
             </a:fld>
             <a:endParaRPr lang="LID4096"/>
           </a:p>
@@ -2635,7 +2803,7 @@
           <a:p>
             <a:fld id="{368142B4-7298-43D0-A9D3-D5CA59C3F615}" type="datetimeFigureOut">
               <a:rPr lang="LID4096" smtClean="0"/>
-              <a:t>06/10/2019</a:t>
+              <a:t>06/11/2019</a:t>
             </a:fld>
             <a:endParaRPr lang="LID4096"/>
           </a:p>
@@ -2953,7 +3121,7 @@
           <a:p>
             <a:fld id="{368142B4-7298-43D0-A9D3-D5CA59C3F615}" type="datetimeFigureOut">
               <a:rPr lang="LID4096" smtClean="0"/>
-              <a:t>06/10/2019</a:t>
+              <a:t>06/11/2019</a:t>
             </a:fld>
             <a:endParaRPr lang="LID4096"/>
           </a:p>
@@ -3247,7 +3415,7 @@
           <a:p>
             <a:fld id="{368142B4-7298-43D0-A9D3-D5CA59C3F615}" type="datetimeFigureOut">
               <a:rPr lang="LID4096" smtClean="0"/>
-              <a:t>06/10/2019</a:t>
+              <a:t>06/11/2019</a:t>
             </a:fld>
             <a:endParaRPr lang="LID4096"/>
           </a:p>
@@ -3490,7 +3658,7 @@
           <a:p>
             <a:fld id="{368142B4-7298-43D0-A9D3-D5CA59C3F615}" type="datetimeFigureOut">
               <a:rPr lang="LID4096" smtClean="0"/>
-              <a:t>06/10/2019</a:t>
+              <a:t>06/11/2019</a:t>
             </a:fld>
             <a:endParaRPr lang="LID4096"/>
           </a:p>
@@ -4344,6 +4512,53 @@
           </a:prstGeom>
         </p:spPr>
       </p:pic>
+      <p:pic>
+        <p:nvPicPr>
+          <p:cNvPr id="1034" name="Picture 10" descr="https://scontent-ams4-1.xx.fbcdn.net/v/t1.15752-9/s2048x2048/61873291_368321040461959_4322615550967545856_n.jpg?_nc_cat=107&amp;_nc_ht=scontent-ams4-1.xx&amp;oh=00a400229feb0718881672a5c9a9aa67&amp;oe=5D94752C">
+            <a:extLst>
+              <a:ext uri="{FF2B5EF4-FFF2-40B4-BE49-F238E27FC236}">
+                <a16:creationId xmlns:a16="http://schemas.microsoft.com/office/drawing/2014/main" id="{D7200B7B-6B99-4EDA-8D9D-D64A27FA8276}"/>
+              </a:ext>
+            </a:extLst>
+          </p:cNvPr>
+          <p:cNvPicPr>
+            <a:picLocks noChangeAspect="1" noChangeArrowheads="1"/>
+          </p:cNvPicPr>
+          <p:nvPr/>
+        </p:nvPicPr>
+        <p:blipFill>
+          <a:blip r:embed="rId4">
+            <a:extLst>
+              <a:ext uri="{28A0092B-C50C-407E-A947-70E740481C1C}">
+                <a14:useLocalDpi xmlns:a14="http://schemas.microsoft.com/office/drawing/2010/main" val="0"/>
+              </a:ext>
+            </a:extLst>
+          </a:blip>
+          <a:srcRect/>
+          <a:stretch>
+            <a:fillRect/>
+          </a:stretch>
+        </p:blipFill>
+        <p:spPr bwMode="auto">
+          <a:xfrm>
+            <a:off x="3261793" y="131699"/>
+            <a:ext cx="2525140" cy="2525140"/>
+          </a:xfrm>
+          <a:prstGeom prst="rect">
+            <a:avLst/>
+          </a:prstGeom>
+          <a:noFill/>
+          <a:extLst>
+            <a:ext uri="{909E8E84-426E-40DD-AFC4-6F175D3DCCD1}">
+              <a14:hiddenFill xmlns:a14="http://schemas.microsoft.com/office/drawing/2010/main">
+                <a:solidFill>
+                  <a:srgbClr val="FFFFFF"/>
+                </a:solidFill>
+              </a14:hiddenFill>
+            </a:ext>
+          </a:extLst>
+        </p:spPr>
+      </p:pic>
       <p:sp>
         <p:nvSpPr>
           <p:cNvPr id="22" name="Subtitle 2">
@@ -4551,7 +4766,7 @@
                   </a:outerShdw>
                 </a:effectLst>
               </a:rPr>
-              <a:t>Dimitar</a:t>
+              <a:t>Dimitr</a:t>
             </a:r>
             <a:r>
               <a:rPr lang="en-US" sz="1800" b="1" dirty="0">
@@ -4681,7 +4896,7 @@
           <p:nvPr/>
         </p:nvPicPr>
         <p:blipFill>
-          <a:blip r:embed="rId4">
+          <a:blip r:embed="rId5">
             <a:extLst>
               <a:ext uri="{28A0092B-C50C-407E-A947-70E740481C1C}">
                 <a14:useLocalDpi xmlns:a14="http://schemas.microsoft.com/office/drawing/2010/main" val="0"/>
@@ -5004,7 +5219,7 @@
           <p:nvPr/>
         </p:nvPicPr>
         <p:blipFill>
-          <a:blip r:embed="rId5">
+          <a:blip r:embed="rId6">
             <a:extLst>
               <a:ext uri="{28A0092B-C50C-407E-A947-70E740481C1C}">
                 <a14:useLocalDpi xmlns:a14="http://schemas.microsoft.com/office/drawing/2010/main" val="0"/>
@@ -5290,36 +5505,6 @@
           </a:p>
         </p:txBody>
       </p:sp>
-      <p:pic>
-        <p:nvPicPr>
-          <p:cNvPr id="6" name="Picture 5">
-            <a:extLst>
-              <a:ext uri="{FF2B5EF4-FFF2-40B4-BE49-F238E27FC236}">
-                <a16:creationId xmlns:a16="http://schemas.microsoft.com/office/drawing/2014/main" id="{7C52DF2F-E3A8-4281-93CA-D91ADA499670}"/>
-              </a:ext>
-            </a:extLst>
-          </p:cNvPr>
-          <p:cNvPicPr>
-            <a:picLocks noChangeAspect="1"/>
-          </p:cNvPicPr>
-          <p:nvPr/>
-        </p:nvPicPr>
-        <p:blipFill>
-          <a:blip r:embed="rId6"/>
-          <a:stretch>
-            <a:fillRect/>
-          </a:stretch>
-        </p:blipFill>
-        <p:spPr>
-          <a:xfrm>
-            <a:off x="3334215" y="133775"/>
-            <a:ext cx="2542478" cy="2547786"/>
-          </a:xfrm>
-          <a:prstGeom prst="rect">
-            <a:avLst/>
-          </a:prstGeom>
-        </p:spPr>
-      </p:pic>
     </p:spTree>
     <p:extLst>
       <p:ext uri="{BB962C8B-B14F-4D97-AF65-F5344CB8AC3E}">
@@ -7884,7 +8069,7 @@
         </p:spPr>
         <p:txBody>
           <a:bodyPr vert="horz" lIns="91440" tIns="45720" rIns="91440" bIns="45720" rtlCol="0" anchor="t" anchorCtr="0">
-            <a:normAutofit/>
+            <a:normAutofit lnSpcReduction="10000"/>
           </a:bodyPr>
           <a:lstStyle>
             <a:lvl1pPr marL="228600" indent="-228600" algn="l" defTabSz="914400" rtl="0" eaLnBrk="1" latinLnBrk="0" hangingPunct="1">
@@ -8061,16 +8246,39 @@
           </a:p>
           <a:p>
             <a:r>
-              <a:rPr lang="en-US" sz="2000" dirty="0">
-                <a:solidFill>
-                  <a:srgbClr val="FF0000"/>
-                </a:solidFill>
-              </a:rPr>
-              <a:t>HERE PLZ ADD WHAT IT IS USED FOR BRIEFLY</a:t>
-            </a:r>
-          </a:p>
-          <a:p>
-            <a:endParaRPr lang="en-US" sz="2000" dirty="0"/>
+              <a:rPr lang="en-US" sz="2000" dirty="0"/>
+              <a:t>Check visitors in and out of event</a:t>
+            </a:r>
+          </a:p>
+          <a:p>
+            <a:r>
+              <a:rPr lang="en-US" sz="2000" dirty="0"/>
+              <a:t>Sell food and beverages at shops</a:t>
+            </a:r>
+          </a:p>
+          <a:p>
+            <a:r>
+              <a:rPr lang="en-US" sz="2000" dirty="0"/>
+              <a:t>Loan and collect items at loan stands</a:t>
+            </a:r>
+          </a:p>
+          <a:p>
+            <a:r>
+              <a:rPr lang="en-US" sz="2000" dirty="0"/>
+              <a:t>Check in to camping spots</a:t>
+            </a:r>
+          </a:p>
+          <a:p>
+            <a:r>
+              <a:rPr lang="en-US" sz="2000" dirty="0"/>
+              <a:t>See overview of event</a:t>
+            </a:r>
+          </a:p>
+          <a:p>
+            <a:r>
+              <a:rPr lang="en-US" sz="2000" dirty="0"/>
+              <a:t>Manage employees</a:t>
+            </a:r>
           </a:p>
         </p:txBody>
       </p:sp>
@@ -8447,7 +8655,7 @@
         <p:spPr>
           <a:xfrm>
             <a:off x="326407" y="1206056"/>
-            <a:ext cx="7756048" cy="5562734"/>
+            <a:ext cx="7756048" cy="5434289"/>
           </a:xfrm>
           <a:prstGeom prst="roundRect">
             <a:avLst/>
@@ -9102,7 +9310,7 @@
         </p:spPr>
         <p:txBody>
           <a:bodyPr vert="horz" lIns="91440" tIns="45720" rIns="91440" bIns="45720" rtlCol="0" anchor="t" anchorCtr="0">
-            <a:normAutofit/>
+            <a:normAutofit lnSpcReduction="10000"/>
           </a:bodyPr>
           <a:lstStyle>
             <a:lvl1pPr marL="228600" indent="-228600" algn="l" defTabSz="914400" rtl="0" eaLnBrk="1" latinLnBrk="0" hangingPunct="1">
@@ -9268,6 +9476,113 @@
               </a:defRPr>
             </a:lvl9pPr>
           </a:lstStyle>
+          <a:p>
+            <a:pPr>
+              <a:lnSpc>
+                <a:spcPct val="150000"/>
+              </a:lnSpc>
+            </a:pPr>
+            <a:r>
+              <a:rPr lang="en-US" sz="2400" dirty="0"/>
+              <a:t>One application used by all employees</a:t>
+            </a:r>
+          </a:p>
+          <a:p>
+            <a:pPr>
+              <a:lnSpc>
+                <a:spcPct val="150000"/>
+              </a:lnSpc>
+            </a:pPr>
+            <a:r>
+              <a:rPr lang="en-US" sz="2400" dirty="0"/>
+              <a:t>Fully tested to be as efficient and user-friendly as possible</a:t>
+            </a:r>
+          </a:p>
+          <a:p>
+            <a:pPr>
+              <a:lnSpc>
+                <a:spcPct val="150000"/>
+              </a:lnSpc>
+              <a:spcBef>
+                <a:spcPts val="0"/>
+              </a:spcBef>
+              <a:spcAft>
+                <a:spcPts val="300"/>
+              </a:spcAft>
+            </a:pPr>
+            <a:r>
+              <a:rPr lang="en-US" sz="2400" dirty="0"/>
+              <a:t>Intuitively understandable interface uses minimal input</a:t>
+            </a:r>
+          </a:p>
+          <a:p>
+            <a:pPr>
+              <a:lnSpc>
+                <a:spcPct val="150000"/>
+              </a:lnSpc>
+              <a:spcBef>
+                <a:spcPts val="0"/>
+              </a:spcBef>
+              <a:spcAft>
+                <a:spcPts val="300"/>
+              </a:spcAft>
+            </a:pPr>
+            <a:r>
+              <a:rPr lang="en-US" sz="2400" dirty="0"/>
+              <a:t>Visitor is given a RFID a bracelet</a:t>
+            </a:r>
+          </a:p>
+          <a:p>
+            <a:pPr>
+              <a:lnSpc>
+                <a:spcPct val="150000"/>
+              </a:lnSpc>
+              <a:spcBef>
+                <a:spcPts val="0"/>
+              </a:spcBef>
+              <a:spcAft>
+                <a:spcPts val="300"/>
+              </a:spcAft>
+            </a:pPr>
+            <a:r>
+              <a:rPr lang="en-US" sz="2400" dirty="0"/>
+              <a:t>Very clear error prevention and handling</a:t>
+            </a:r>
+          </a:p>
+          <a:p>
+            <a:pPr>
+              <a:lnSpc>
+                <a:spcPct val="150000"/>
+              </a:lnSpc>
+              <a:spcBef>
+                <a:spcPts val="0"/>
+              </a:spcBef>
+              <a:spcAft>
+                <a:spcPts val="300"/>
+              </a:spcAft>
+            </a:pPr>
+            <a:r>
+              <a:rPr lang="en-US" sz="2400" dirty="0"/>
+              <a:t>Very expandable (MVVM structure)</a:t>
+            </a:r>
+          </a:p>
+          <a:p>
+            <a:pPr>
+              <a:lnSpc>
+                <a:spcPct val="150000"/>
+              </a:lnSpc>
+              <a:spcBef>
+                <a:spcPts val="0"/>
+              </a:spcBef>
+              <a:spcAft>
+                <a:spcPts val="300"/>
+              </a:spcAft>
+            </a:pPr>
+            <a:r>
+              <a:rPr lang="en-US" sz="2400" dirty="0"/>
+              <a:t>Designed to service many visitors quickly</a:t>
+            </a:r>
+          </a:p>
           <a:p>
             <a:endParaRPr lang="en-US" sz="2000" dirty="0"/>
           </a:p>
@@ -9308,7 +9623,7 @@
           <p:cNvPr id="2" name="Title 1">
             <a:extLst>
               <a:ext uri="{FF2B5EF4-FFF2-40B4-BE49-F238E27FC236}">
-                <a16:creationId xmlns:a16="http://schemas.microsoft.com/office/drawing/2014/main" id="{F63FBDD3-B090-4780-8982-DAB9A8586842}"/>
+                <a16:creationId xmlns:a16="http://schemas.microsoft.com/office/drawing/2014/main" id="{7591BD8E-0D03-4BC9-8586-E0CD5B594800}"/>
               </a:ext>
             </a:extLst>
           </p:cNvPr>
@@ -9319,32 +9634,12 @@
             <p:ph type="title"/>
           </p:nvPr>
         </p:nvSpPr>
-        <p:spPr/>
-        <p:txBody>
-          <a:bodyPr/>
-          <a:lstStyle/>
-          <a:p>
-            <a:endParaRPr lang="LID4096"/>
-          </a:p>
-        </p:txBody>
-      </p:sp>
-      <p:sp>
-        <p:nvSpPr>
-          <p:cNvPr id="3" name="Content Placeholder 2">
-            <a:extLst>
-              <a:ext uri="{FF2B5EF4-FFF2-40B4-BE49-F238E27FC236}">
-                <a16:creationId xmlns:a16="http://schemas.microsoft.com/office/drawing/2014/main" id="{8EF97072-949A-4BD4-A50F-03DB64860597}"/>
-              </a:ext>
-            </a:extLst>
-          </p:cNvPr>
-          <p:cNvSpPr>
-            <a:spLocks noGrp="1"/>
-          </p:cNvSpPr>
-          <p:nvPr>
-            <p:ph idx="1"/>
-          </p:nvPr>
-        </p:nvSpPr>
-        <p:spPr/>
+        <p:spPr>
+          <a:xfrm>
+            <a:off x="838200" y="365125"/>
+            <a:ext cx="10515600" cy="1325563"/>
+          </a:xfrm>
+        </p:spPr>
         <p:txBody>
           <a:bodyPr/>
           <a:lstStyle/>
@@ -9355,11 +9650,46 @@
       </p:sp>
       <p:pic>
         <p:nvPicPr>
+          <p:cNvPr id="10" name="Content Placeholder 9" descr="A person smiling for the camera&#10;&#10;Description automatically generated">
+            <a:extLst>
+              <a:ext uri="{FF2B5EF4-FFF2-40B4-BE49-F238E27FC236}">
+                <a16:creationId xmlns:a16="http://schemas.microsoft.com/office/drawing/2014/main" id="{133F03E5-15D3-4385-9CA3-4450AFC178CD}"/>
+              </a:ext>
+            </a:extLst>
+          </p:cNvPr>
+          <p:cNvPicPr>
+            <a:picLocks noGrp="1" noChangeAspect="1"/>
+          </p:cNvPicPr>
+          <p:nvPr>
+            <p:ph idx="1"/>
+          </p:nvPr>
+        </p:nvPicPr>
+        <p:blipFill>
+          <a:blip r:embed="rId3">
+            <a:extLst>
+              <a:ext uri="{28A0092B-C50C-407E-A947-70E740481C1C}">
+                <a14:useLocalDpi xmlns:a14="http://schemas.microsoft.com/office/drawing/2010/main" val="0"/>
+              </a:ext>
+            </a:extLst>
+          </a:blip>
+          <a:stretch>
+            <a:fillRect/>
+          </a:stretch>
+        </p:blipFill>
+        <p:spPr>
+          <a:xfrm>
+            <a:off x="4146266" y="1825625"/>
+            <a:ext cx="3899468" cy="4351338"/>
+          </a:xfrm>
+        </p:spPr>
+      </p:pic>
+      <p:pic>
+        <p:nvPicPr>
           <p:cNvPr id="4" name="Picture 2" descr="ÐÐ¾Ñ Ð¾Ð¶ÐµÐµ Ð¸Ð·Ð¾Ð±ÑÐ°Ð¶ÐµÐ½Ð¸Ðµ">
             <a:extLst>
               <a:ext uri="{FF2B5EF4-FFF2-40B4-BE49-F238E27FC236}">
-                <a16:creationId xmlns:a16="http://schemas.microsoft.com/office/drawing/2014/main" id="{CC0E93B5-6821-4A83-9F6E-01394E053CC3}"/>
+                <a16:creationId xmlns:a16="http://schemas.microsoft.com/office/drawing/2014/main" id="{E0BC9BC6-10AB-434E-90A8-4CCBC5C57995}"/>
               </a:ext>
             </a:extLst>
           </p:cNvPr>
@@ -9369,7 +9699,7 @@
           <p:nvPr/>
         </p:nvPicPr>
         <p:blipFill rotWithShape="1">
-          <a:blip r:embed="rId2">
+          <a:blip r:embed="rId4">
             <a:extLst>
               <a:ext uri="{28A0092B-C50C-407E-A947-70E740481C1C}">
                 <a14:useLocalDpi xmlns:a14="http://schemas.microsoft.com/office/drawing/2010/main" val="0"/>
@@ -9404,7 +9734,7 @@
           <p:cNvPr id="5" name="Content Placeholder 2">
             <a:extLst>
               <a:ext uri="{FF2B5EF4-FFF2-40B4-BE49-F238E27FC236}">
-                <a16:creationId xmlns:a16="http://schemas.microsoft.com/office/drawing/2014/main" id="{7325A91E-2D3F-45A5-ACE9-21B163A194CD}"/>
+                <a16:creationId xmlns:a16="http://schemas.microsoft.com/office/drawing/2014/main" id="{2A016881-7F37-4819-8C3A-197A253EAB8E}"/>
               </a:ext>
             </a:extLst>
           </p:cNvPr>
@@ -9615,10 +9945,275 @@
           </a:p>
         </p:txBody>
       </p:sp>
+      <p:sp>
+        <p:nvSpPr>
+          <p:cNvPr id="7" name="Content Placeholder 2">
+            <a:extLst>
+              <a:ext uri="{FF2B5EF4-FFF2-40B4-BE49-F238E27FC236}">
+                <a16:creationId xmlns:a16="http://schemas.microsoft.com/office/drawing/2014/main" id="{1D1C7D81-3D3F-42C3-A16C-20AB725E4E23}"/>
+              </a:ext>
+            </a:extLst>
+          </p:cNvPr>
+          <p:cNvSpPr txBox="1">
+            <a:spLocks/>
+          </p:cNvSpPr>
+          <p:nvPr/>
+        </p:nvSpPr>
+        <p:spPr>
+          <a:xfrm>
+            <a:off x="326407" y="1581911"/>
+            <a:ext cx="6899583" cy="3090450"/>
+          </a:xfrm>
+          <a:prstGeom prst="roundRect">
+            <a:avLst/>
+          </a:prstGeom>
+          <a:solidFill>
+            <a:schemeClr val="bg1">
+              <a:alpha val="93000"/>
+            </a:schemeClr>
+          </a:solidFill>
+          <a:effectLst>
+            <a:outerShdw dist="50800" algn="ctr" rotWithShape="0">
+              <a:srgbClr val="000000">
+                <a:alpha val="43137"/>
+              </a:srgbClr>
+            </a:outerShdw>
+            <a:softEdge rad="0"/>
+          </a:effectLst>
+        </p:spPr>
+        <p:txBody>
+          <a:bodyPr vert="horz" lIns="91440" tIns="45720" rIns="91440" bIns="45720" rtlCol="0" anchor="t" anchorCtr="0">
+            <a:normAutofit/>
+          </a:bodyPr>
+          <a:lstStyle>
+            <a:lvl1pPr marL="228600" indent="-228600" algn="l" defTabSz="914400" rtl="0" eaLnBrk="1" latinLnBrk="0" hangingPunct="1">
+              <a:lnSpc>
+                <a:spcPct val="90000"/>
+              </a:lnSpc>
+              <a:spcBef>
+                <a:spcPts val="1000"/>
+              </a:spcBef>
+              <a:buFont typeface="Arial" panose="020B0604020202020204" pitchFamily="34" charset="0"/>
+              <a:buChar char="•"/>
+              <a:defRPr sz="2800" kern="1200">
+                <a:solidFill>
+                  <a:schemeClr val="tx1"/>
+                </a:solidFill>
+                <a:latin typeface="+mn-lt"/>
+                <a:ea typeface="+mn-ea"/>
+                <a:cs typeface="+mn-cs"/>
+              </a:defRPr>
+            </a:lvl1pPr>
+            <a:lvl2pPr marL="685800" indent="-228600" algn="l" defTabSz="914400" rtl="0" eaLnBrk="1" latinLnBrk="0" hangingPunct="1">
+              <a:lnSpc>
+                <a:spcPct val="90000"/>
+              </a:lnSpc>
+              <a:spcBef>
+                <a:spcPts val="500"/>
+              </a:spcBef>
+              <a:buFont typeface="Arial" panose="020B0604020202020204" pitchFamily="34" charset="0"/>
+              <a:buChar char="•"/>
+              <a:defRPr sz="2400" kern="1200">
+                <a:solidFill>
+                  <a:schemeClr val="tx1"/>
+                </a:solidFill>
+                <a:latin typeface="+mn-lt"/>
+                <a:ea typeface="+mn-ea"/>
+                <a:cs typeface="+mn-cs"/>
+              </a:defRPr>
+            </a:lvl2pPr>
+            <a:lvl3pPr marL="1143000" indent="-228600" algn="l" defTabSz="914400" rtl="0" eaLnBrk="1" latinLnBrk="0" hangingPunct="1">
+              <a:lnSpc>
+                <a:spcPct val="90000"/>
+              </a:lnSpc>
+              <a:spcBef>
+                <a:spcPts val="500"/>
+              </a:spcBef>
+              <a:buFont typeface="Arial" panose="020B0604020202020204" pitchFamily="34" charset="0"/>
+              <a:buChar char="•"/>
+              <a:defRPr sz="2000" kern="1200">
+                <a:solidFill>
+                  <a:schemeClr val="tx1"/>
+                </a:solidFill>
+                <a:latin typeface="+mn-lt"/>
+                <a:ea typeface="+mn-ea"/>
+                <a:cs typeface="+mn-cs"/>
+              </a:defRPr>
+            </a:lvl3pPr>
+            <a:lvl4pPr marL="1600200" indent="-228600" algn="l" defTabSz="914400" rtl="0" eaLnBrk="1" latinLnBrk="0" hangingPunct="1">
+              <a:lnSpc>
+                <a:spcPct val="90000"/>
+              </a:lnSpc>
+              <a:spcBef>
+                <a:spcPts val="500"/>
+              </a:spcBef>
+              <a:buFont typeface="Arial" panose="020B0604020202020204" pitchFamily="34" charset="0"/>
+              <a:buChar char="•"/>
+              <a:defRPr sz="1800" kern="1200">
+                <a:solidFill>
+                  <a:schemeClr val="tx1"/>
+                </a:solidFill>
+                <a:latin typeface="+mn-lt"/>
+                <a:ea typeface="+mn-ea"/>
+                <a:cs typeface="+mn-cs"/>
+              </a:defRPr>
+            </a:lvl4pPr>
+            <a:lvl5pPr marL="2057400" indent="-228600" algn="l" defTabSz="914400" rtl="0" eaLnBrk="1" latinLnBrk="0" hangingPunct="1">
+              <a:lnSpc>
+                <a:spcPct val="90000"/>
+              </a:lnSpc>
+              <a:spcBef>
+                <a:spcPts val="500"/>
+              </a:spcBef>
+              <a:buFont typeface="Arial" panose="020B0604020202020204" pitchFamily="34" charset="0"/>
+              <a:buChar char="•"/>
+              <a:defRPr sz="1800" kern="1200">
+                <a:solidFill>
+                  <a:schemeClr val="tx1"/>
+                </a:solidFill>
+                <a:latin typeface="+mn-lt"/>
+                <a:ea typeface="+mn-ea"/>
+                <a:cs typeface="+mn-cs"/>
+              </a:defRPr>
+            </a:lvl5pPr>
+            <a:lvl6pPr marL="2514600" indent="-228600" algn="l" defTabSz="914400" rtl="0" eaLnBrk="1" latinLnBrk="0" hangingPunct="1">
+              <a:lnSpc>
+                <a:spcPct val="90000"/>
+              </a:lnSpc>
+              <a:spcBef>
+                <a:spcPts val="500"/>
+              </a:spcBef>
+              <a:buFont typeface="Arial" panose="020B0604020202020204" pitchFamily="34" charset="0"/>
+              <a:buChar char="•"/>
+              <a:defRPr sz="1800" kern="1200">
+                <a:solidFill>
+                  <a:schemeClr val="tx1"/>
+                </a:solidFill>
+                <a:latin typeface="+mn-lt"/>
+                <a:ea typeface="+mn-ea"/>
+                <a:cs typeface="+mn-cs"/>
+              </a:defRPr>
+            </a:lvl6pPr>
+            <a:lvl7pPr marL="2971800" indent="-228600" algn="l" defTabSz="914400" rtl="0" eaLnBrk="1" latinLnBrk="0" hangingPunct="1">
+              <a:lnSpc>
+                <a:spcPct val="90000"/>
+              </a:lnSpc>
+              <a:spcBef>
+                <a:spcPts val="500"/>
+              </a:spcBef>
+              <a:buFont typeface="Arial" panose="020B0604020202020204" pitchFamily="34" charset="0"/>
+              <a:buChar char="•"/>
+              <a:defRPr sz="1800" kern="1200">
+                <a:solidFill>
+                  <a:schemeClr val="tx1"/>
+                </a:solidFill>
+                <a:latin typeface="+mn-lt"/>
+                <a:ea typeface="+mn-ea"/>
+                <a:cs typeface="+mn-cs"/>
+              </a:defRPr>
+            </a:lvl7pPr>
+            <a:lvl8pPr marL="3429000" indent="-228600" algn="l" defTabSz="914400" rtl="0" eaLnBrk="1" latinLnBrk="0" hangingPunct="1">
+              <a:lnSpc>
+                <a:spcPct val="90000"/>
+              </a:lnSpc>
+              <a:spcBef>
+                <a:spcPts val="500"/>
+              </a:spcBef>
+              <a:buFont typeface="Arial" panose="020B0604020202020204" pitchFamily="34" charset="0"/>
+              <a:buChar char="•"/>
+              <a:defRPr sz="1800" kern="1200">
+                <a:solidFill>
+                  <a:schemeClr val="tx1"/>
+                </a:solidFill>
+                <a:latin typeface="+mn-lt"/>
+                <a:ea typeface="+mn-ea"/>
+                <a:cs typeface="+mn-cs"/>
+              </a:defRPr>
+            </a:lvl8pPr>
+            <a:lvl9pPr marL="3886200" indent="-228600" algn="l" defTabSz="914400" rtl="0" eaLnBrk="1" latinLnBrk="0" hangingPunct="1">
+              <a:lnSpc>
+                <a:spcPct val="90000"/>
+              </a:lnSpc>
+              <a:spcBef>
+                <a:spcPts val="500"/>
+              </a:spcBef>
+              <a:buFont typeface="Arial" panose="020B0604020202020204" pitchFamily="34" charset="0"/>
+              <a:buChar char="•"/>
+              <a:defRPr sz="1800" kern="1200">
+                <a:solidFill>
+                  <a:schemeClr val="tx1"/>
+                </a:solidFill>
+                <a:latin typeface="+mn-lt"/>
+                <a:ea typeface="+mn-ea"/>
+                <a:cs typeface="+mn-cs"/>
+              </a:defRPr>
+            </a:lvl9pPr>
+          </a:lstStyle>
+          <a:p>
+            <a:r>
+              <a:rPr lang="en-US" dirty="0"/>
+              <a:t>Unique and Educating experience</a:t>
+            </a:r>
+          </a:p>
+          <a:p>
+            <a:r>
+              <a:rPr lang="en-US" dirty="0"/>
+              <a:t>Stressful at times</a:t>
+            </a:r>
+          </a:p>
+          <a:p>
+            <a:r>
+              <a:rPr lang="en-US" dirty="0"/>
+              <a:t>Happy with result</a:t>
+            </a:r>
+          </a:p>
+          <a:p>
+            <a:r>
+              <a:rPr lang="en-US" dirty="0"/>
+              <a:t>Happy with amazing team</a:t>
+            </a:r>
+          </a:p>
+        </p:txBody>
+      </p:sp>
+      <p:pic>
+        <p:nvPicPr>
+          <p:cNvPr id="12" name="Picture 11" descr="A person smiling for the camera&#10;&#10;Description automatically generated">
+            <a:extLst>
+              <a:ext uri="{FF2B5EF4-FFF2-40B4-BE49-F238E27FC236}">
+                <a16:creationId xmlns:a16="http://schemas.microsoft.com/office/drawing/2014/main" id="{90D38602-D4D3-42D0-9BC7-8B279F2CD735}"/>
+              </a:ext>
+            </a:extLst>
+          </p:cNvPr>
+          <p:cNvPicPr>
+            <a:picLocks noChangeAspect="1"/>
+          </p:cNvPicPr>
+          <p:nvPr/>
+        </p:nvPicPr>
+        <p:blipFill rotWithShape="1">
+          <a:blip r:embed="rId3">
+            <a:extLst>
+              <a:ext uri="{28A0092B-C50C-407E-A947-70E740481C1C}">
+                <a14:useLocalDpi xmlns:a14="http://schemas.microsoft.com/office/drawing/2010/main" val="0"/>
+              </a:ext>
+            </a:extLst>
+          </a:blip>
+          <a:srcRect b="4018"/>
+          <a:stretch/>
+        </p:blipFill>
+        <p:spPr>
+          <a:xfrm>
+            <a:off x="7426943" y="1027906"/>
+            <a:ext cx="4438650" cy="4753956"/>
+          </a:xfrm>
+          <a:prstGeom prst="rect">
+            <a:avLst/>
+          </a:prstGeom>
+        </p:spPr>
+      </p:pic>
     </p:spTree>
     <p:extLst>
       <p:ext uri="{BB962C8B-B14F-4D97-AF65-F5344CB8AC3E}">
-        <p14:creationId xmlns:p14="http://schemas.microsoft.com/office/powerpoint/2010/main" val="2159283910"/>
+        <p14:creationId xmlns:p14="http://schemas.microsoft.com/office/powerpoint/2010/main" val="3680456980"/>
       </p:ext>
     </p:extLst>
   </p:cSld>
@@ -9953,6 +10548,236 @@
             <a:r>
               <a:rPr lang="en-US" sz="3200" dirty="0"/>
               <a:t>Personal impression: Martin</a:t>
+            </a:r>
+          </a:p>
+        </p:txBody>
+      </p:sp>
+      <p:sp>
+        <p:nvSpPr>
+          <p:cNvPr id="6" name="Content Placeholder 2">
+            <a:extLst>
+              <a:ext uri="{FF2B5EF4-FFF2-40B4-BE49-F238E27FC236}">
+                <a16:creationId xmlns:a16="http://schemas.microsoft.com/office/drawing/2014/main" id="{9D264BF3-0F84-41DB-B18C-0CAAC46BD9C0}"/>
+              </a:ext>
+            </a:extLst>
+          </p:cNvPr>
+          <p:cNvSpPr txBox="1">
+            <a:spLocks/>
+          </p:cNvSpPr>
+          <p:nvPr/>
+        </p:nvSpPr>
+        <p:spPr>
+          <a:xfrm>
+            <a:off x="326407" y="1581911"/>
+            <a:ext cx="6899583" cy="3090450"/>
+          </a:xfrm>
+          <a:prstGeom prst="roundRect">
+            <a:avLst/>
+          </a:prstGeom>
+          <a:solidFill>
+            <a:schemeClr val="bg1">
+              <a:alpha val="93000"/>
+            </a:schemeClr>
+          </a:solidFill>
+          <a:effectLst>
+            <a:outerShdw dist="50800" algn="ctr" rotWithShape="0">
+              <a:srgbClr val="000000">
+                <a:alpha val="43137"/>
+              </a:srgbClr>
+            </a:outerShdw>
+            <a:softEdge rad="0"/>
+          </a:effectLst>
+        </p:spPr>
+        <p:txBody>
+          <a:bodyPr vert="horz" lIns="91440" tIns="45720" rIns="91440" bIns="45720" rtlCol="0" anchor="t" anchorCtr="0">
+            <a:normAutofit/>
+          </a:bodyPr>
+          <a:lstStyle>
+            <a:lvl1pPr marL="228600" indent="-228600" algn="l" defTabSz="914400" rtl="0" eaLnBrk="1" latinLnBrk="0" hangingPunct="1">
+              <a:lnSpc>
+                <a:spcPct val="90000"/>
+              </a:lnSpc>
+              <a:spcBef>
+                <a:spcPts val="1000"/>
+              </a:spcBef>
+              <a:buFont typeface="Arial" panose="020B0604020202020204" pitchFamily="34" charset="0"/>
+              <a:buChar char="•"/>
+              <a:defRPr sz="2800" kern="1200">
+                <a:solidFill>
+                  <a:schemeClr val="tx1"/>
+                </a:solidFill>
+                <a:latin typeface="+mn-lt"/>
+                <a:ea typeface="+mn-ea"/>
+                <a:cs typeface="+mn-cs"/>
+              </a:defRPr>
+            </a:lvl1pPr>
+            <a:lvl2pPr marL="685800" indent="-228600" algn="l" defTabSz="914400" rtl="0" eaLnBrk="1" latinLnBrk="0" hangingPunct="1">
+              <a:lnSpc>
+                <a:spcPct val="90000"/>
+              </a:lnSpc>
+              <a:spcBef>
+                <a:spcPts val="500"/>
+              </a:spcBef>
+              <a:buFont typeface="Arial" panose="020B0604020202020204" pitchFamily="34" charset="0"/>
+              <a:buChar char="•"/>
+              <a:defRPr sz="2400" kern="1200">
+                <a:solidFill>
+                  <a:schemeClr val="tx1"/>
+                </a:solidFill>
+                <a:latin typeface="+mn-lt"/>
+                <a:ea typeface="+mn-ea"/>
+                <a:cs typeface="+mn-cs"/>
+              </a:defRPr>
+            </a:lvl2pPr>
+            <a:lvl3pPr marL="1143000" indent="-228600" algn="l" defTabSz="914400" rtl="0" eaLnBrk="1" latinLnBrk="0" hangingPunct="1">
+              <a:lnSpc>
+                <a:spcPct val="90000"/>
+              </a:lnSpc>
+              <a:spcBef>
+                <a:spcPts val="500"/>
+              </a:spcBef>
+              <a:buFont typeface="Arial" panose="020B0604020202020204" pitchFamily="34" charset="0"/>
+              <a:buChar char="•"/>
+              <a:defRPr sz="2000" kern="1200">
+                <a:solidFill>
+                  <a:schemeClr val="tx1"/>
+                </a:solidFill>
+                <a:latin typeface="+mn-lt"/>
+                <a:ea typeface="+mn-ea"/>
+                <a:cs typeface="+mn-cs"/>
+              </a:defRPr>
+            </a:lvl3pPr>
+            <a:lvl4pPr marL="1600200" indent="-228600" algn="l" defTabSz="914400" rtl="0" eaLnBrk="1" latinLnBrk="0" hangingPunct="1">
+              <a:lnSpc>
+                <a:spcPct val="90000"/>
+              </a:lnSpc>
+              <a:spcBef>
+                <a:spcPts val="500"/>
+              </a:spcBef>
+              <a:buFont typeface="Arial" panose="020B0604020202020204" pitchFamily="34" charset="0"/>
+              <a:buChar char="•"/>
+              <a:defRPr sz="1800" kern="1200">
+                <a:solidFill>
+                  <a:schemeClr val="tx1"/>
+                </a:solidFill>
+                <a:latin typeface="+mn-lt"/>
+                <a:ea typeface="+mn-ea"/>
+                <a:cs typeface="+mn-cs"/>
+              </a:defRPr>
+            </a:lvl4pPr>
+            <a:lvl5pPr marL="2057400" indent="-228600" algn="l" defTabSz="914400" rtl="0" eaLnBrk="1" latinLnBrk="0" hangingPunct="1">
+              <a:lnSpc>
+                <a:spcPct val="90000"/>
+              </a:lnSpc>
+              <a:spcBef>
+                <a:spcPts val="500"/>
+              </a:spcBef>
+              <a:buFont typeface="Arial" panose="020B0604020202020204" pitchFamily="34" charset="0"/>
+              <a:buChar char="•"/>
+              <a:defRPr sz="1800" kern="1200">
+                <a:solidFill>
+                  <a:schemeClr val="tx1"/>
+                </a:solidFill>
+                <a:latin typeface="+mn-lt"/>
+                <a:ea typeface="+mn-ea"/>
+                <a:cs typeface="+mn-cs"/>
+              </a:defRPr>
+            </a:lvl5pPr>
+            <a:lvl6pPr marL="2514600" indent="-228600" algn="l" defTabSz="914400" rtl="0" eaLnBrk="1" latinLnBrk="0" hangingPunct="1">
+              <a:lnSpc>
+                <a:spcPct val="90000"/>
+              </a:lnSpc>
+              <a:spcBef>
+                <a:spcPts val="500"/>
+              </a:spcBef>
+              <a:buFont typeface="Arial" panose="020B0604020202020204" pitchFamily="34" charset="0"/>
+              <a:buChar char="•"/>
+              <a:defRPr sz="1800" kern="1200">
+                <a:solidFill>
+                  <a:schemeClr val="tx1"/>
+                </a:solidFill>
+                <a:latin typeface="+mn-lt"/>
+                <a:ea typeface="+mn-ea"/>
+                <a:cs typeface="+mn-cs"/>
+              </a:defRPr>
+            </a:lvl6pPr>
+            <a:lvl7pPr marL="2971800" indent="-228600" algn="l" defTabSz="914400" rtl="0" eaLnBrk="1" latinLnBrk="0" hangingPunct="1">
+              <a:lnSpc>
+                <a:spcPct val="90000"/>
+              </a:lnSpc>
+              <a:spcBef>
+                <a:spcPts val="500"/>
+              </a:spcBef>
+              <a:buFont typeface="Arial" panose="020B0604020202020204" pitchFamily="34" charset="0"/>
+              <a:buChar char="•"/>
+              <a:defRPr sz="1800" kern="1200">
+                <a:solidFill>
+                  <a:schemeClr val="tx1"/>
+                </a:solidFill>
+                <a:latin typeface="+mn-lt"/>
+                <a:ea typeface="+mn-ea"/>
+                <a:cs typeface="+mn-cs"/>
+              </a:defRPr>
+            </a:lvl7pPr>
+            <a:lvl8pPr marL="3429000" indent="-228600" algn="l" defTabSz="914400" rtl="0" eaLnBrk="1" latinLnBrk="0" hangingPunct="1">
+              <a:lnSpc>
+                <a:spcPct val="90000"/>
+              </a:lnSpc>
+              <a:spcBef>
+                <a:spcPts val="500"/>
+              </a:spcBef>
+              <a:buFont typeface="Arial" panose="020B0604020202020204" pitchFamily="34" charset="0"/>
+              <a:buChar char="•"/>
+              <a:defRPr sz="1800" kern="1200">
+                <a:solidFill>
+                  <a:schemeClr val="tx1"/>
+                </a:solidFill>
+                <a:latin typeface="+mn-lt"/>
+                <a:ea typeface="+mn-ea"/>
+                <a:cs typeface="+mn-cs"/>
+              </a:defRPr>
+            </a:lvl8pPr>
+            <a:lvl9pPr marL="3886200" indent="-228600" algn="l" defTabSz="914400" rtl="0" eaLnBrk="1" latinLnBrk="0" hangingPunct="1">
+              <a:lnSpc>
+                <a:spcPct val="90000"/>
+              </a:lnSpc>
+              <a:spcBef>
+                <a:spcPts val="500"/>
+              </a:spcBef>
+              <a:buFont typeface="Arial" panose="020B0604020202020204" pitchFamily="34" charset="0"/>
+              <a:buChar char="•"/>
+              <a:defRPr sz="1800" kern="1200">
+                <a:solidFill>
+                  <a:schemeClr val="tx1"/>
+                </a:solidFill>
+                <a:latin typeface="+mn-lt"/>
+                <a:ea typeface="+mn-ea"/>
+                <a:cs typeface="+mn-cs"/>
+              </a:defRPr>
+            </a:lvl9pPr>
+          </a:lstStyle>
+          <a:p>
+            <a:r>
+              <a:rPr lang="en-US" dirty="0"/>
+              <a:t>Overall great experience</a:t>
+            </a:r>
+          </a:p>
+          <a:p>
+            <a:r>
+              <a:rPr lang="en-US" dirty="0"/>
+              <a:t>The project felt like working with real clients</a:t>
+            </a:r>
+          </a:p>
+          <a:p>
+            <a:r>
+              <a:rPr lang="en-US" dirty="0"/>
+              <a:t>Satisfied with the finished product</a:t>
+            </a:r>
+          </a:p>
+          <a:p>
+            <a:r>
+              <a:rPr lang="en-US" dirty="0"/>
+              <a:t>More than satisfied with our team and time management</a:t>
             </a:r>
           </a:p>
         </p:txBody>
@@ -10304,6 +11129,244 @@
           </a:p>
         </p:txBody>
       </p:sp>
+      <p:sp>
+        <p:nvSpPr>
+          <p:cNvPr id="6" name="Content Placeholder 2">
+            <a:extLst>
+              <a:ext uri="{FF2B5EF4-FFF2-40B4-BE49-F238E27FC236}">
+                <a16:creationId xmlns:a16="http://schemas.microsoft.com/office/drawing/2014/main" id="{E3B2A7C0-9E6E-415E-BD97-5D51E0373ECF}"/>
+              </a:ext>
+            </a:extLst>
+          </p:cNvPr>
+          <p:cNvSpPr txBox="1">
+            <a:spLocks/>
+          </p:cNvSpPr>
+          <p:nvPr/>
+        </p:nvSpPr>
+        <p:spPr>
+          <a:xfrm>
+            <a:off x="326407" y="1581911"/>
+            <a:ext cx="6899583" cy="3090450"/>
+          </a:xfrm>
+          <a:prstGeom prst="roundRect">
+            <a:avLst/>
+          </a:prstGeom>
+          <a:solidFill>
+            <a:schemeClr val="bg1">
+              <a:alpha val="93000"/>
+            </a:schemeClr>
+          </a:solidFill>
+          <a:effectLst>
+            <a:outerShdw dist="50800" algn="ctr" rotWithShape="0">
+              <a:srgbClr val="000000">
+                <a:alpha val="43137"/>
+              </a:srgbClr>
+            </a:outerShdw>
+            <a:softEdge rad="0"/>
+          </a:effectLst>
+        </p:spPr>
+        <p:txBody>
+          <a:bodyPr vert="horz" lIns="91440" tIns="45720" rIns="91440" bIns="45720" rtlCol="0" anchor="t" anchorCtr="0">
+            <a:normAutofit/>
+          </a:bodyPr>
+          <a:lstStyle>
+            <a:lvl1pPr marL="228600" indent="-228600" algn="l" defTabSz="914400" rtl="0" eaLnBrk="1" latinLnBrk="0" hangingPunct="1">
+              <a:lnSpc>
+                <a:spcPct val="90000"/>
+              </a:lnSpc>
+              <a:spcBef>
+                <a:spcPts val="1000"/>
+              </a:spcBef>
+              <a:buFont typeface="Arial" panose="020B0604020202020204" pitchFamily="34" charset="0"/>
+              <a:buChar char="•"/>
+              <a:defRPr sz="2800" kern="1200">
+                <a:solidFill>
+                  <a:schemeClr val="tx1"/>
+                </a:solidFill>
+                <a:latin typeface="+mn-lt"/>
+                <a:ea typeface="+mn-ea"/>
+                <a:cs typeface="+mn-cs"/>
+              </a:defRPr>
+            </a:lvl1pPr>
+            <a:lvl2pPr marL="685800" indent="-228600" algn="l" defTabSz="914400" rtl="0" eaLnBrk="1" latinLnBrk="0" hangingPunct="1">
+              <a:lnSpc>
+                <a:spcPct val="90000"/>
+              </a:lnSpc>
+              <a:spcBef>
+                <a:spcPts val="500"/>
+              </a:spcBef>
+              <a:buFont typeface="Arial" panose="020B0604020202020204" pitchFamily="34" charset="0"/>
+              <a:buChar char="•"/>
+              <a:defRPr sz="2400" kern="1200">
+                <a:solidFill>
+                  <a:schemeClr val="tx1"/>
+                </a:solidFill>
+                <a:latin typeface="+mn-lt"/>
+                <a:ea typeface="+mn-ea"/>
+                <a:cs typeface="+mn-cs"/>
+              </a:defRPr>
+            </a:lvl2pPr>
+            <a:lvl3pPr marL="1143000" indent="-228600" algn="l" defTabSz="914400" rtl="0" eaLnBrk="1" latinLnBrk="0" hangingPunct="1">
+              <a:lnSpc>
+                <a:spcPct val="90000"/>
+              </a:lnSpc>
+              <a:spcBef>
+                <a:spcPts val="500"/>
+              </a:spcBef>
+              <a:buFont typeface="Arial" panose="020B0604020202020204" pitchFamily="34" charset="0"/>
+              <a:buChar char="•"/>
+              <a:defRPr sz="2000" kern="1200">
+                <a:solidFill>
+                  <a:schemeClr val="tx1"/>
+                </a:solidFill>
+                <a:latin typeface="+mn-lt"/>
+                <a:ea typeface="+mn-ea"/>
+                <a:cs typeface="+mn-cs"/>
+              </a:defRPr>
+            </a:lvl3pPr>
+            <a:lvl4pPr marL="1600200" indent="-228600" algn="l" defTabSz="914400" rtl="0" eaLnBrk="1" latinLnBrk="0" hangingPunct="1">
+              <a:lnSpc>
+                <a:spcPct val="90000"/>
+              </a:lnSpc>
+              <a:spcBef>
+                <a:spcPts val="500"/>
+              </a:spcBef>
+              <a:buFont typeface="Arial" panose="020B0604020202020204" pitchFamily="34" charset="0"/>
+              <a:buChar char="•"/>
+              <a:defRPr sz="1800" kern="1200">
+                <a:solidFill>
+                  <a:schemeClr val="tx1"/>
+                </a:solidFill>
+                <a:latin typeface="+mn-lt"/>
+                <a:ea typeface="+mn-ea"/>
+                <a:cs typeface="+mn-cs"/>
+              </a:defRPr>
+            </a:lvl4pPr>
+            <a:lvl5pPr marL="2057400" indent="-228600" algn="l" defTabSz="914400" rtl="0" eaLnBrk="1" latinLnBrk="0" hangingPunct="1">
+              <a:lnSpc>
+                <a:spcPct val="90000"/>
+              </a:lnSpc>
+              <a:spcBef>
+                <a:spcPts val="500"/>
+              </a:spcBef>
+              <a:buFont typeface="Arial" panose="020B0604020202020204" pitchFamily="34" charset="0"/>
+              <a:buChar char="•"/>
+              <a:defRPr sz="1800" kern="1200">
+                <a:solidFill>
+                  <a:schemeClr val="tx1"/>
+                </a:solidFill>
+                <a:latin typeface="+mn-lt"/>
+                <a:ea typeface="+mn-ea"/>
+                <a:cs typeface="+mn-cs"/>
+              </a:defRPr>
+            </a:lvl5pPr>
+            <a:lvl6pPr marL="2514600" indent="-228600" algn="l" defTabSz="914400" rtl="0" eaLnBrk="1" latinLnBrk="0" hangingPunct="1">
+              <a:lnSpc>
+                <a:spcPct val="90000"/>
+              </a:lnSpc>
+              <a:spcBef>
+                <a:spcPts val="500"/>
+              </a:spcBef>
+              <a:buFont typeface="Arial" panose="020B0604020202020204" pitchFamily="34" charset="0"/>
+              <a:buChar char="•"/>
+              <a:defRPr sz="1800" kern="1200">
+                <a:solidFill>
+                  <a:schemeClr val="tx1"/>
+                </a:solidFill>
+                <a:latin typeface="+mn-lt"/>
+                <a:ea typeface="+mn-ea"/>
+                <a:cs typeface="+mn-cs"/>
+              </a:defRPr>
+            </a:lvl6pPr>
+            <a:lvl7pPr marL="2971800" indent="-228600" algn="l" defTabSz="914400" rtl="0" eaLnBrk="1" latinLnBrk="0" hangingPunct="1">
+              <a:lnSpc>
+                <a:spcPct val="90000"/>
+              </a:lnSpc>
+              <a:spcBef>
+                <a:spcPts val="500"/>
+              </a:spcBef>
+              <a:buFont typeface="Arial" panose="020B0604020202020204" pitchFamily="34" charset="0"/>
+              <a:buChar char="•"/>
+              <a:defRPr sz="1800" kern="1200">
+                <a:solidFill>
+                  <a:schemeClr val="tx1"/>
+                </a:solidFill>
+                <a:latin typeface="+mn-lt"/>
+                <a:ea typeface="+mn-ea"/>
+                <a:cs typeface="+mn-cs"/>
+              </a:defRPr>
+            </a:lvl7pPr>
+            <a:lvl8pPr marL="3429000" indent="-228600" algn="l" defTabSz="914400" rtl="0" eaLnBrk="1" latinLnBrk="0" hangingPunct="1">
+              <a:lnSpc>
+                <a:spcPct val="90000"/>
+              </a:lnSpc>
+              <a:spcBef>
+                <a:spcPts val="500"/>
+              </a:spcBef>
+              <a:buFont typeface="Arial" panose="020B0604020202020204" pitchFamily="34" charset="0"/>
+              <a:buChar char="•"/>
+              <a:defRPr sz="1800" kern="1200">
+                <a:solidFill>
+                  <a:schemeClr val="tx1"/>
+                </a:solidFill>
+                <a:latin typeface="+mn-lt"/>
+                <a:ea typeface="+mn-ea"/>
+                <a:cs typeface="+mn-cs"/>
+              </a:defRPr>
+            </a:lvl8pPr>
+            <a:lvl9pPr marL="3886200" indent="-228600" algn="l" defTabSz="914400" rtl="0" eaLnBrk="1" latinLnBrk="0" hangingPunct="1">
+              <a:lnSpc>
+                <a:spcPct val="90000"/>
+              </a:lnSpc>
+              <a:spcBef>
+                <a:spcPts val="500"/>
+              </a:spcBef>
+              <a:buFont typeface="Arial" panose="020B0604020202020204" pitchFamily="34" charset="0"/>
+              <a:buChar char="•"/>
+              <a:defRPr sz="1800" kern="1200">
+                <a:solidFill>
+                  <a:schemeClr val="tx1"/>
+                </a:solidFill>
+                <a:latin typeface="+mn-lt"/>
+                <a:ea typeface="+mn-ea"/>
+                <a:cs typeface="+mn-cs"/>
+              </a:defRPr>
+            </a:lvl9pPr>
+          </a:lstStyle>
+          <a:p>
+            <a:r>
+              <a:rPr lang="en-US" dirty="0"/>
+              <a:t>Perfect first try in ICT projects</a:t>
+            </a:r>
+          </a:p>
+          <a:p>
+            <a:r>
+              <a:rPr lang="en-US" dirty="0"/>
+              <a:t>Good team = Good result</a:t>
+            </a:r>
+          </a:p>
+          <a:p>
+            <a:r>
+              <a:rPr lang="en-US" dirty="0"/>
+              <a:t>It was like having a real job</a:t>
+            </a:r>
+          </a:p>
+          <a:p>
+            <a:r>
+              <a:rPr lang="en-US" dirty="0"/>
+              <a:t>Looking positive for </a:t>
+            </a:r>
+            <a:r>
+              <a:rPr lang="en-US"/>
+              <a:t>future project</a:t>
+            </a:r>
+            <a:r>
+              <a:rPr lang="en-US" dirty="0"/>
+              <a:t>s</a:t>
+            </a:r>
+          </a:p>
+        </p:txBody>
+      </p:sp>
     </p:spTree>
     <p:extLst>
       <p:ext uri="{BB962C8B-B14F-4D97-AF65-F5344CB8AC3E}">
@@ -10410,7 +11473,7 @@
           <p:nvPr/>
         </p:nvPicPr>
         <p:blipFill rotWithShape="1">
-          <a:blip r:embed="rId2">
+          <a:blip r:embed="rId3">
             <a:extLst>
               <a:ext uri="{28A0092B-C50C-407E-A947-70E740481C1C}">
                 <a14:useLocalDpi xmlns:a14="http://schemas.microsoft.com/office/drawing/2010/main" val="0"/>
@@ -10671,7 +11734,7 @@
           <p:nvPr/>
         </p:nvPicPr>
         <p:blipFill>
-          <a:blip r:embed="rId3">
+          <a:blip r:embed="rId4">
             <a:extLst>
               <a:ext uri="{28A0092B-C50C-407E-A947-70E740481C1C}">
                 <a14:useLocalDpi xmlns:a14="http://schemas.microsoft.com/office/drawing/2010/main" val="0"/>
@@ -10948,7 +12011,7 @@
           <p:nvPr/>
         </p:nvPicPr>
         <p:blipFill>
-          <a:blip r:embed="rId4">
+          <a:blip r:embed="rId5">
             <a:extLst>
               <a:ext uri="{28A0092B-C50C-407E-A947-70E740481C1C}">
                 <a14:useLocalDpi xmlns:a14="http://schemas.microsoft.com/office/drawing/2010/main" val="0"/>

</xml_diff>